<commit_message>
gitignore syncthing files, update slide_template
</commit_message>
<xml_diff>
--- a/slide_template.pptx
+++ b/slide_template.pptx
@@ -104,6 +104,11 @@
       </a:defRPr>
     </a:lvl9pPr>
   </p:defaultTextStyle>
+  <p:extLst>
+    <p:ext uri="{EFAFB233-063F-42B5-8137-9DF3F51BA10A}">
+      <p15:sldGuideLst xmlns:p15="http://schemas.microsoft.com/office/powerpoint/2012/main"/>
+    </p:ext>
+  </p:extLst>
 </p:presentation>
 </file>
 
@@ -136,8 +141,8 @@
         </p:nvSpPr>
         <p:spPr>
           <a:xfrm>
-            <a:off x="838200" y="365125"/>
-            <a:ext cx="10515600" cy="5782582"/>
+            <a:off x="253093" y="365125"/>
+            <a:ext cx="11609614" cy="5954032"/>
           </a:xfrm>
         </p:spPr>
         <p:txBody>
@@ -164,8 +169,8 @@
         </p:nvSpPr>
         <p:spPr>
           <a:xfrm>
-            <a:off x="838200" y="6280151"/>
-            <a:ext cx="10515600" cy="365125"/>
+            <a:off x="0" y="6484262"/>
+            <a:ext cx="11353800" cy="365125"/>
           </a:xfrm>
           <a:prstGeom prst="rect">
             <a:avLst/>
@@ -273,7 +278,7 @@
           <a:p>
             <a:pPr algn="l"/>
             <a:r>
-              <a:rPr lang="en-US" dirty="0" smtClean="0">
+              <a:rPr lang="en-US" sz="2400" dirty="0" smtClean="0">
                 <a:solidFill>
                   <a:schemeClr val="accent1"/>
                 </a:solidFill>
@@ -281,10 +286,10 @@
               <a:t>P</a:t>
             </a:r>
             <a:r>
-              <a:rPr lang="en-US" dirty="0" smtClean="0"/>
+              <a:rPr lang="en-US" sz="2400" dirty="0" smtClean="0"/>
               <a:t>YMI.VN</a:t>
             </a:r>
-            <a:endParaRPr lang="en-US" dirty="0"/>
+            <a:endParaRPr lang="en-US" sz="2400" dirty="0"/>
           </a:p>
         </p:txBody>
       </p:sp>
@@ -296,8 +301,8 @@
         </p:nvCxnSpPr>
         <p:spPr>
           <a:xfrm>
-            <a:off x="838200" y="6280151"/>
-            <a:ext cx="10515600" cy="0"/>
+            <a:off x="0" y="6459765"/>
+            <a:ext cx="12192000" cy="0"/>
           </a:xfrm>
           <a:prstGeom prst="line">
             <a:avLst/>

</xml_diff>